<commit_message>
reorganized code folder, experimented in vivaldo and ltspice, updated software section of powerpoint
</commit_message>
<xml_diff>
--- a/Presentations/Presentation Jan 26.pptx
+++ b/Presentations/Presentation Jan 26.pptx
@@ -12044,13 +12044,8 @@
             <a:pPr lvl="1"/>
             <a:r>
               <a:rPr lang="en-US" sz="1800" dirty="0"/>
-              <a:t>We familiarized ourselves with </a:t>
-            </a:r>
-            <a:r>
-              <a:rPr lang="en-US" sz="1800" dirty="0" err="1"/>
-              <a:t>LTspice</a:t>
-            </a:r>
-            <a:endParaRPr lang="en-US" sz="1800" dirty="0"/>
+              <a:t>We familiarized ourselves with LTspice</a:t>
+            </a:r>
           </a:p>
           <a:p>
             <a:r>
@@ -12509,19 +12504,83 @@
             </a:pPr>
             <a:r>
               <a:rPr lang="en-US" dirty="0"/>
-              <a:t>We ran a couple of test programs on </a:t>
-            </a:r>
-            <a:r>
-              <a:rPr lang="en-US" dirty="0" err="1"/>
-              <a:t>vivado</a:t>
-            </a:r>
-            <a:r>
-              <a:rPr lang="en-US" dirty="0"/>
-              <a:t> to refamiliarize ourselves with Verilog and this new IDE. </a:t>
-            </a:r>
-          </a:p>
-        </p:txBody>
-      </p:sp>
+              <a:t>We ran a couple of test programs on Vivado to refamiliarize ourselves with Verilog and this new IDE. </a:t>
+            </a:r>
+          </a:p>
+        </p:txBody>
+      </p:sp>
+      <p:pic>
+        <p:nvPicPr>
+          <p:cNvPr id="5" name="Picture 4" descr="Text&#10;&#10;Description automatically generated">
+            <a:extLst>
+              <a:ext uri="{FF2B5EF4-FFF2-40B4-BE49-F238E27FC236}">
+                <a16:creationId xmlns:a16="http://schemas.microsoft.com/office/drawing/2014/main" id="{32E39510-5628-4D16-9814-F41483183498}"/>
+              </a:ext>
+            </a:extLst>
+          </p:cNvPr>
+          <p:cNvPicPr>
+            <a:picLocks noChangeAspect="1"/>
+          </p:cNvPicPr>
+          <p:nvPr/>
+        </p:nvPicPr>
+        <p:blipFill>
+          <a:blip r:embed="rId2">
+            <a:extLst>
+              <a:ext uri="{28A0092B-C50C-407E-A947-70E740481C1C}">
+                <a14:useLocalDpi xmlns:a14="http://schemas.microsoft.com/office/drawing/2010/main" val="0"/>
+              </a:ext>
+            </a:extLst>
+          </a:blip>
+          <a:stretch>
+            <a:fillRect/>
+          </a:stretch>
+        </p:blipFill>
+        <p:spPr>
+          <a:xfrm>
+            <a:off x="408623" y="3740069"/>
+            <a:ext cx="3363278" cy="2779432"/>
+          </a:xfrm>
+          <a:prstGeom prst="rect">
+            <a:avLst/>
+          </a:prstGeom>
+        </p:spPr>
+      </p:pic>
+      <p:pic>
+        <p:nvPicPr>
+          <p:cNvPr id="11" name="Picture 10" descr="Graphical user interface&#10;&#10;Description automatically generated">
+            <a:extLst>
+              <a:ext uri="{FF2B5EF4-FFF2-40B4-BE49-F238E27FC236}">
+                <a16:creationId xmlns:a16="http://schemas.microsoft.com/office/drawing/2014/main" id="{47FA40C9-B2A0-4FF8-BCAA-DB03B923738A}"/>
+              </a:ext>
+            </a:extLst>
+          </p:cNvPr>
+          <p:cNvPicPr>
+            <a:picLocks noChangeAspect="1"/>
+          </p:cNvPicPr>
+          <p:nvPr/>
+        </p:nvPicPr>
+        <p:blipFill>
+          <a:blip r:embed="rId3">
+            <a:extLst>
+              <a:ext uri="{28A0092B-C50C-407E-A947-70E740481C1C}">
+                <a14:useLocalDpi xmlns:a14="http://schemas.microsoft.com/office/drawing/2010/main" val="0"/>
+              </a:ext>
+            </a:extLst>
+          </a:blip>
+          <a:stretch>
+            <a:fillRect/>
+          </a:stretch>
+        </p:blipFill>
+        <p:spPr>
+          <a:xfrm>
+            <a:off x="4478845" y="3740068"/>
+            <a:ext cx="6901733" cy="2779431"/>
+          </a:xfrm>
+          <a:prstGeom prst="rect">
+            <a:avLst/>
+          </a:prstGeom>
+        </p:spPr>
+      </p:pic>
     </p:spTree>
     <p:extLst>
       <p:ext uri="{BB962C8B-B14F-4D97-AF65-F5344CB8AC3E}">
@@ -12606,19 +12665,83 @@
             </a:pPr>
             <a:r>
               <a:rPr lang="en-US" dirty="0"/>
-              <a:t>Installed and practiced using </a:t>
-            </a:r>
-            <a:r>
-              <a:rPr lang="en-US" dirty="0" err="1"/>
-              <a:t>LTspice</a:t>
-            </a:r>
-            <a:r>
-              <a:rPr lang="en-US" dirty="0"/>
-              <a:t> to familiarize ourselves with the program and how to design some circuits.  </a:t>
-            </a:r>
-          </a:p>
-        </p:txBody>
-      </p:sp>
+              <a:t>Installed and practiced using LTspice to familiarize ourselves with the program and how to design some circuits.  </a:t>
+            </a:r>
+          </a:p>
+        </p:txBody>
+      </p:sp>
+      <p:pic>
+        <p:nvPicPr>
+          <p:cNvPr id="5" name="Picture 4" descr="Diagram, schematic&#10;&#10;Description automatically generated">
+            <a:extLst>
+              <a:ext uri="{FF2B5EF4-FFF2-40B4-BE49-F238E27FC236}">
+                <a16:creationId xmlns:a16="http://schemas.microsoft.com/office/drawing/2014/main" id="{A2544BF7-C201-4305-B0E9-177960AB5B70}"/>
+              </a:ext>
+            </a:extLst>
+          </p:cNvPr>
+          <p:cNvPicPr>
+            <a:picLocks noChangeAspect="1"/>
+          </p:cNvPicPr>
+          <p:nvPr/>
+        </p:nvPicPr>
+        <p:blipFill>
+          <a:blip r:embed="rId2">
+            <a:extLst>
+              <a:ext uri="{28A0092B-C50C-407E-A947-70E740481C1C}">
+                <a14:useLocalDpi xmlns:a14="http://schemas.microsoft.com/office/drawing/2010/main" val="0"/>
+              </a:ext>
+            </a:extLst>
+          </a:blip>
+          <a:stretch>
+            <a:fillRect/>
+          </a:stretch>
+        </p:blipFill>
+        <p:spPr>
+          <a:xfrm>
+            <a:off x="191025" y="3570923"/>
+            <a:ext cx="5501072" cy="2948957"/>
+          </a:xfrm>
+          <a:prstGeom prst="rect">
+            <a:avLst/>
+          </a:prstGeom>
+        </p:spPr>
+      </p:pic>
+      <p:pic>
+        <p:nvPicPr>
+          <p:cNvPr id="7" name="Picture 6" descr="Background pattern&#10;&#10;Description automatically generated with medium confidence">
+            <a:extLst>
+              <a:ext uri="{FF2B5EF4-FFF2-40B4-BE49-F238E27FC236}">
+                <a16:creationId xmlns:a16="http://schemas.microsoft.com/office/drawing/2014/main" id="{F792A904-EED8-4326-A9AA-32FA325ADFA7}"/>
+              </a:ext>
+            </a:extLst>
+          </p:cNvPr>
+          <p:cNvPicPr>
+            <a:picLocks noChangeAspect="1"/>
+          </p:cNvPicPr>
+          <p:nvPr/>
+        </p:nvPicPr>
+        <p:blipFill>
+          <a:blip r:embed="rId3">
+            <a:extLst>
+              <a:ext uri="{28A0092B-C50C-407E-A947-70E740481C1C}">
+                <a14:useLocalDpi xmlns:a14="http://schemas.microsoft.com/office/drawing/2010/main" val="0"/>
+              </a:ext>
+            </a:extLst>
+          </a:blip>
+          <a:stretch>
+            <a:fillRect/>
+          </a:stretch>
+        </p:blipFill>
+        <p:spPr>
+          <a:xfrm>
+            <a:off x="5746370" y="3570922"/>
+            <a:ext cx="6254605" cy="2948958"/>
+          </a:xfrm>
+          <a:prstGeom prst="rect">
+            <a:avLst/>
+          </a:prstGeom>
+        </p:spPr>
+      </p:pic>
     </p:spTree>
     <p:extLst>
       <p:ext uri="{BB962C8B-B14F-4D97-AF65-F5344CB8AC3E}">
@@ -12703,19 +12826,41 @@
             </a:pPr>
             <a:r>
               <a:rPr lang="en-US" dirty="0"/>
-              <a:t>We decided to switch from Microsoft </a:t>
-            </a:r>
-            <a:r>
-              <a:rPr lang="en-US" dirty="0" err="1"/>
-              <a:t>Onedrive</a:t>
-            </a:r>
-            <a:r>
-              <a:rPr lang="en-US" dirty="0"/>
-              <a:t> to GitLab as we were having issues syncing data.</a:t>
-            </a:r>
-          </a:p>
-        </p:txBody>
-      </p:sp>
+              <a:t>We decided to switch from Microsoft OneDrive to GitLab as we were having issues syncing data.</a:t>
+            </a:r>
+          </a:p>
+        </p:txBody>
+      </p:sp>
+      <p:pic>
+        <p:nvPicPr>
+          <p:cNvPr id="5" name="Picture 4">
+            <a:extLst>
+              <a:ext uri="{FF2B5EF4-FFF2-40B4-BE49-F238E27FC236}">
+                <a16:creationId xmlns:a16="http://schemas.microsoft.com/office/drawing/2014/main" id="{19A62DDC-151A-473C-BBB1-C504379A5889}"/>
+              </a:ext>
+            </a:extLst>
+          </p:cNvPr>
+          <p:cNvPicPr>
+            <a:picLocks noChangeAspect="1"/>
+          </p:cNvPicPr>
+          <p:nvPr/>
+        </p:nvPicPr>
+        <p:blipFill>
+          <a:blip r:embed="rId2"/>
+          <a:stretch>
+            <a:fillRect/>
+          </a:stretch>
+        </p:blipFill>
+        <p:spPr>
+          <a:xfrm>
+            <a:off x="1437625" y="3438048"/>
+            <a:ext cx="9316750" cy="3419952"/>
+          </a:xfrm>
+          <a:prstGeom prst="rect">
+            <a:avLst/>
+          </a:prstGeom>
+        </p:spPr>
+      </p:pic>
     </p:spTree>
     <p:extLst>
       <p:ext uri="{BB962C8B-B14F-4D97-AF65-F5344CB8AC3E}">

</xml_diff>

<commit_message>
Added a minor update to the presentation.
</commit_message>
<xml_diff>
--- a/Presentations/Presentation Jan 26.pptx
+++ b/Presentations/Presentation Jan 26.pptx
@@ -11536,6 +11536,58 @@
           </a:p>
         </p:txBody>
       </p:sp>
+      <p:sp>
+        <p:nvSpPr>
+          <p:cNvPr id="14" name="Rectangle 13">
+            <a:extLst>
+              <a:ext uri="{FF2B5EF4-FFF2-40B4-BE49-F238E27FC236}">
+                <a16:creationId xmlns:a16="http://schemas.microsoft.com/office/drawing/2014/main" id="{6F182BAF-680B-4F1C-AB5F-6C72BD64B14F}"/>
+              </a:ext>
+            </a:extLst>
+          </p:cNvPr>
+          <p:cNvSpPr/>
+          <p:nvPr/>
+        </p:nvSpPr>
+        <p:spPr>
+          <a:xfrm>
+            <a:off x="10949707" y="1725684"/>
+            <a:ext cx="570782" cy="1314943"/>
+          </a:xfrm>
+          <a:prstGeom prst="rect">
+            <a:avLst/>
+          </a:prstGeom>
+          <a:noFill/>
+          <a:ln>
+            <a:solidFill>
+              <a:srgbClr val="FF0000"/>
+            </a:solidFill>
+          </a:ln>
+        </p:spPr>
+        <p:style>
+          <a:lnRef idx="2">
+            <a:schemeClr val="accent1">
+              <a:shade val="50000"/>
+            </a:schemeClr>
+          </a:lnRef>
+          <a:fillRef idx="1">
+            <a:schemeClr val="accent1"/>
+          </a:fillRef>
+          <a:effectRef idx="0">
+            <a:schemeClr val="accent1"/>
+          </a:effectRef>
+          <a:fontRef idx="minor">
+            <a:schemeClr val="lt1"/>
+          </a:fontRef>
+        </p:style>
+        <p:txBody>
+          <a:bodyPr rtlCol="0" anchor="ctr"/>
+          <a:lstStyle/>
+          <a:p>
+            <a:pPr algn="ctr"/>
+            <a:endParaRPr lang="en-US"/>
+          </a:p>
+        </p:txBody>
+      </p:sp>
     </p:spTree>
     <p:extLst>
       <p:ext uri="{BB962C8B-B14F-4D97-AF65-F5344CB8AC3E}">
@@ -13132,6 +13184,58 @@
           </a:p>
         </p:txBody>
       </p:sp>
+      <p:sp>
+        <p:nvSpPr>
+          <p:cNvPr id="3" name="Rectangle 2">
+            <a:extLst>
+              <a:ext uri="{FF2B5EF4-FFF2-40B4-BE49-F238E27FC236}">
+                <a16:creationId xmlns:a16="http://schemas.microsoft.com/office/drawing/2014/main" id="{374F1D9D-4F5C-4ABA-8E17-FCAAB7F2944C}"/>
+              </a:ext>
+            </a:extLst>
+          </p:cNvPr>
+          <p:cNvSpPr/>
+          <p:nvPr/>
+        </p:nvSpPr>
+        <p:spPr>
+          <a:xfrm>
+            <a:off x="5079993" y="3429000"/>
+            <a:ext cx="5575307" cy="165100"/>
+          </a:xfrm>
+          <a:prstGeom prst="rect">
+            <a:avLst/>
+          </a:prstGeom>
+          <a:noFill/>
+          <a:ln>
+            <a:solidFill>
+              <a:srgbClr val="FF0000"/>
+            </a:solidFill>
+          </a:ln>
+        </p:spPr>
+        <p:style>
+          <a:lnRef idx="2">
+            <a:schemeClr val="accent1">
+              <a:shade val="50000"/>
+            </a:schemeClr>
+          </a:lnRef>
+          <a:fillRef idx="1">
+            <a:schemeClr val="accent1"/>
+          </a:fillRef>
+          <a:effectRef idx="0">
+            <a:schemeClr val="accent1"/>
+          </a:effectRef>
+          <a:fontRef idx="minor">
+            <a:schemeClr val="lt1"/>
+          </a:fontRef>
+        </p:style>
+        <p:txBody>
+          <a:bodyPr rtlCol="0" anchor="ctr"/>
+          <a:lstStyle/>
+          <a:p>
+            <a:pPr algn="ctr"/>
+            <a:endParaRPr lang="en-US"/>
+          </a:p>
+        </p:txBody>
+      </p:sp>
     </p:spTree>
     <p:extLst>
       <p:ext uri="{BB962C8B-B14F-4D97-AF65-F5344CB8AC3E}">
@@ -17029,7 +17133,7 @@
           <p:nvPr/>
         </p:nvPicPr>
         <p:blipFill>
-          <a:blip r:embed="rId2">
+          <a:blip r:embed="rId2" cstate="print">
             <a:extLst>
               <a:ext uri="{28A0092B-C50C-407E-A947-70E740481C1C}">
                 <a14:useLocalDpi xmlns:a14="http://schemas.microsoft.com/office/drawing/2010/main" val="0"/>
@@ -17829,7 +17933,7 @@
           <p:nvPr/>
         </p:nvPicPr>
         <p:blipFill>
-          <a:blip r:embed="rId2">
+          <a:blip r:embed="rId2" cstate="print">
             <a:extLst>
               <a:ext uri="{28A0092B-C50C-407E-A947-70E740481C1C}">
                 <a14:useLocalDpi xmlns:a14="http://schemas.microsoft.com/office/drawing/2010/main" val="0"/>

</xml_diff>

<commit_message>
Added a photo, updated the budget, and added Feb 2 Presentation.
</commit_message>
<xml_diff>
--- a/Presentations/Presentation Jan 26.pptx
+++ b/Presentations/Presentation Jan 26.pptx
@@ -11536,58 +11536,6 @@
           </a:p>
         </p:txBody>
       </p:sp>
-      <p:sp>
-        <p:nvSpPr>
-          <p:cNvPr id="14" name="Rectangle 13">
-            <a:extLst>
-              <a:ext uri="{FF2B5EF4-FFF2-40B4-BE49-F238E27FC236}">
-                <a16:creationId xmlns:a16="http://schemas.microsoft.com/office/drawing/2014/main" id="{6F182BAF-680B-4F1C-AB5F-6C72BD64B14F}"/>
-              </a:ext>
-            </a:extLst>
-          </p:cNvPr>
-          <p:cNvSpPr/>
-          <p:nvPr/>
-        </p:nvSpPr>
-        <p:spPr>
-          <a:xfrm>
-            <a:off x="10949707" y="1725684"/>
-            <a:ext cx="570782" cy="1314943"/>
-          </a:xfrm>
-          <a:prstGeom prst="rect">
-            <a:avLst/>
-          </a:prstGeom>
-          <a:noFill/>
-          <a:ln>
-            <a:solidFill>
-              <a:srgbClr val="FF0000"/>
-            </a:solidFill>
-          </a:ln>
-        </p:spPr>
-        <p:style>
-          <a:lnRef idx="2">
-            <a:schemeClr val="accent1">
-              <a:shade val="50000"/>
-            </a:schemeClr>
-          </a:lnRef>
-          <a:fillRef idx="1">
-            <a:schemeClr val="accent1"/>
-          </a:fillRef>
-          <a:effectRef idx="0">
-            <a:schemeClr val="accent1"/>
-          </a:effectRef>
-          <a:fontRef idx="minor">
-            <a:schemeClr val="lt1"/>
-          </a:fontRef>
-        </p:style>
-        <p:txBody>
-          <a:bodyPr rtlCol="0" anchor="ctr"/>
-          <a:lstStyle/>
-          <a:p>
-            <a:pPr algn="ctr"/>
-            <a:endParaRPr lang="en-US"/>
-          </a:p>
-        </p:txBody>
-      </p:sp>
     </p:spTree>
     <p:extLst>
       <p:ext uri="{BB962C8B-B14F-4D97-AF65-F5344CB8AC3E}">
@@ -13184,58 +13132,6 @@
           </a:p>
         </p:txBody>
       </p:sp>
-      <p:sp>
-        <p:nvSpPr>
-          <p:cNvPr id="3" name="Rectangle 2">
-            <a:extLst>
-              <a:ext uri="{FF2B5EF4-FFF2-40B4-BE49-F238E27FC236}">
-                <a16:creationId xmlns:a16="http://schemas.microsoft.com/office/drawing/2014/main" id="{374F1D9D-4F5C-4ABA-8E17-FCAAB7F2944C}"/>
-              </a:ext>
-            </a:extLst>
-          </p:cNvPr>
-          <p:cNvSpPr/>
-          <p:nvPr/>
-        </p:nvSpPr>
-        <p:spPr>
-          <a:xfrm>
-            <a:off x="5079993" y="3429000"/>
-            <a:ext cx="5575307" cy="165100"/>
-          </a:xfrm>
-          <a:prstGeom prst="rect">
-            <a:avLst/>
-          </a:prstGeom>
-          <a:noFill/>
-          <a:ln>
-            <a:solidFill>
-              <a:srgbClr val="FF0000"/>
-            </a:solidFill>
-          </a:ln>
-        </p:spPr>
-        <p:style>
-          <a:lnRef idx="2">
-            <a:schemeClr val="accent1">
-              <a:shade val="50000"/>
-            </a:schemeClr>
-          </a:lnRef>
-          <a:fillRef idx="1">
-            <a:schemeClr val="accent1"/>
-          </a:fillRef>
-          <a:effectRef idx="0">
-            <a:schemeClr val="accent1"/>
-          </a:effectRef>
-          <a:fontRef idx="minor">
-            <a:schemeClr val="lt1"/>
-          </a:fontRef>
-        </p:style>
-        <p:txBody>
-          <a:bodyPr rtlCol="0" anchor="ctr"/>
-          <a:lstStyle/>
-          <a:p>
-            <a:pPr algn="ctr"/>
-            <a:endParaRPr lang="en-US"/>
-          </a:p>
-        </p:txBody>
-      </p:sp>
     </p:spTree>
     <p:extLst>
       <p:ext uri="{BB962C8B-B14F-4D97-AF65-F5344CB8AC3E}">
@@ -17133,7 +17029,7 @@
           <p:nvPr/>
         </p:nvPicPr>
         <p:blipFill>
-          <a:blip r:embed="rId2" cstate="print">
+          <a:blip r:embed="rId2">
             <a:extLst>
               <a:ext uri="{28A0092B-C50C-407E-A947-70E740481C1C}">
                 <a14:useLocalDpi xmlns:a14="http://schemas.microsoft.com/office/drawing/2010/main" val="0"/>
@@ -17933,7 +17829,7 @@
           <p:nvPr/>
         </p:nvPicPr>
         <p:blipFill>
-          <a:blip r:embed="rId2" cstate="print">
+          <a:blip r:embed="rId2">
             <a:extLst>
               <a:ext uri="{28A0092B-C50C-407E-A947-70E740481C1C}">
                 <a14:useLocalDpi xmlns:a14="http://schemas.microsoft.com/office/drawing/2010/main" val="0"/>

</xml_diff>